<commit_message>
Report, reference and presentation update
I updated the report, added references and made a power point for our presentation to Nick's parents.
</commit_message>
<xml_diff>
--- a/40_docs/For final project IDS720.pptx
+++ b/40_docs/For final project IDS720.pptx
@@ -7,7 +7,8 @@
   <p:sldIdLst>
     <p:sldId id="256" r:id="rId2"/>
     <p:sldId id="257" r:id="rId3"/>
-    <p:sldId id="258" r:id="rId4"/>
+    <p:sldId id="260" r:id="rId4"/>
+    <p:sldId id="261" r:id="rId5"/>
   </p:sldIdLst>
   <p:sldSz cx="12192000" cy="6858000"/>
   <p:notesSz cx="6858000" cy="9144000"/>
@@ -106,6 +107,11 @@
       </a:defRPr>
     </a:lvl9pPr>
   </p:defaultTextStyle>
+  <p:extLst>
+    <p:ext uri="{EFAFB233-063F-42B5-8137-9DF3F51BA10A}">
+      <p15:sldGuideLst xmlns:p15="http://schemas.microsoft.com/office/powerpoint/2012/main"/>
+    </p:ext>
+  </p:extLst>
 </p:presentation>
 </file>
 
@@ -256,7 +262,7 @@
           <a:p>
             <a:fld id="{FD20A9A8-4821-4AD6-8048-591D0B5131ED}" type="datetimeFigureOut">
               <a:rPr lang="en-US" smtClean="0"/>
-              <a:t>11/9/2021</a:t>
+              <a:t>11/19/2021</a:t>
             </a:fld>
             <a:endParaRPr lang="en-US"/>
           </a:p>
@@ -454,7 +460,7 @@
           <a:p>
             <a:fld id="{FD20A9A8-4821-4AD6-8048-591D0B5131ED}" type="datetimeFigureOut">
               <a:rPr lang="en-US" smtClean="0"/>
-              <a:t>11/9/2021</a:t>
+              <a:t>11/19/2021</a:t>
             </a:fld>
             <a:endParaRPr lang="en-US"/>
           </a:p>
@@ -662,7 +668,7 @@
           <a:p>
             <a:fld id="{FD20A9A8-4821-4AD6-8048-591D0B5131ED}" type="datetimeFigureOut">
               <a:rPr lang="en-US" smtClean="0"/>
-              <a:t>11/9/2021</a:t>
+              <a:t>11/19/2021</a:t>
             </a:fld>
             <a:endParaRPr lang="en-US"/>
           </a:p>
@@ -860,7 +866,7 @@
           <a:p>
             <a:fld id="{FD20A9A8-4821-4AD6-8048-591D0B5131ED}" type="datetimeFigureOut">
               <a:rPr lang="en-US" smtClean="0"/>
-              <a:t>11/9/2021</a:t>
+              <a:t>11/19/2021</a:t>
             </a:fld>
             <a:endParaRPr lang="en-US"/>
           </a:p>
@@ -1135,7 +1141,7 @@
           <a:p>
             <a:fld id="{FD20A9A8-4821-4AD6-8048-591D0B5131ED}" type="datetimeFigureOut">
               <a:rPr lang="en-US" smtClean="0"/>
-              <a:t>11/9/2021</a:t>
+              <a:t>11/19/2021</a:t>
             </a:fld>
             <a:endParaRPr lang="en-US"/>
           </a:p>
@@ -1400,7 +1406,7 @@
           <a:p>
             <a:fld id="{FD20A9A8-4821-4AD6-8048-591D0B5131ED}" type="datetimeFigureOut">
               <a:rPr lang="en-US" smtClean="0"/>
-              <a:t>11/9/2021</a:t>
+              <a:t>11/19/2021</a:t>
             </a:fld>
             <a:endParaRPr lang="en-US"/>
           </a:p>
@@ -1812,7 +1818,7 @@
           <a:p>
             <a:fld id="{FD20A9A8-4821-4AD6-8048-591D0B5131ED}" type="datetimeFigureOut">
               <a:rPr lang="en-US" smtClean="0"/>
-              <a:t>11/9/2021</a:t>
+              <a:t>11/19/2021</a:t>
             </a:fld>
             <a:endParaRPr lang="en-US"/>
           </a:p>
@@ -1953,7 +1959,7 @@
           <a:p>
             <a:fld id="{FD20A9A8-4821-4AD6-8048-591D0B5131ED}" type="datetimeFigureOut">
               <a:rPr lang="en-US" smtClean="0"/>
-              <a:t>11/9/2021</a:t>
+              <a:t>11/19/2021</a:t>
             </a:fld>
             <a:endParaRPr lang="en-US"/>
           </a:p>
@@ -2066,7 +2072,7 @@
           <a:p>
             <a:fld id="{FD20A9A8-4821-4AD6-8048-591D0B5131ED}" type="datetimeFigureOut">
               <a:rPr lang="en-US" smtClean="0"/>
-              <a:t>11/9/2021</a:t>
+              <a:t>11/19/2021</a:t>
             </a:fld>
             <a:endParaRPr lang="en-US"/>
           </a:p>
@@ -2377,7 +2383,7 @@
           <a:p>
             <a:fld id="{FD20A9A8-4821-4AD6-8048-591D0B5131ED}" type="datetimeFigureOut">
               <a:rPr lang="en-US" smtClean="0"/>
-              <a:t>11/9/2021</a:t>
+              <a:t>11/19/2021</a:t>
             </a:fld>
             <a:endParaRPr lang="en-US"/>
           </a:p>
@@ -2665,7 +2671,7 @@
           <a:p>
             <a:fld id="{FD20A9A8-4821-4AD6-8048-591D0B5131ED}" type="datetimeFigureOut">
               <a:rPr lang="en-US" smtClean="0"/>
-              <a:t>11/9/2021</a:t>
+              <a:t>11/19/2021</a:t>
             </a:fld>
             <a:endParaRPr lang="en-US"/>
           </a:p>
@@ -2906,7 +2912,7 @@
           <a:p>
             <a:fld id="{FD20A9A8-4821-4AD6-8048-591D0B5131ED}" type="datetimeFigureOut">
               <a:rPr lang="en-US" smtClean="0"/>
-              <a:t>11/9/2021</a:t>
+              <a:t>11/19/2021</a:t>
             </a:fld>
             <a:endParaRPr lang="en-US"/>
           </a:p>
@@ -3346,7 +3352,7 @@
           <a:p>
             <a:r>
               <a:rPr lang="en-US" dirty="0"/>
-              <a:t>For final project IDS720</a:t>
+              <a:t>Final project IDS720</a:t>
             </a:r>
           </a:p>
         </p:txBody>
@@ -3372,7 +3378,24 @@
           <a:bodyPr/>
           <a:lstStyle/>
           <a:p>
-            <a:endParaRPr lang="en-US"/>
+            <a:r>
+              <a:rPr lang="en-US" dirty="0"/>
+              <a:t>Professor: Nick Eubank</a:t>
+            </a:r>
+          </a:p>
+          <a:p>
+            <a:r>
+              <a:rPr lang="en-US" dirty="0"/>
+              <a:t>Team 8 – </a:t>
+            </a:r>
+            <a:r>
+              <a:rPr lang="en-US" dirty="0" err="1"/>
+              <a:t>Weiliang</a:t>
+            </a:r>
+            <a:r>
+              <a:rPr lang="en-US" dirty="0"/>
+              <a:t> Hu, Emma Mavis, Fides Schwartz, Yongxin Tan</a:t>
+            </a:r>
           </a:p>
         </p:txBody>
       </p:sp>
@@ -3416,10 +3439,10 @@
       </p:grpSpPr>
       <p:pic>
         <p:nvPicPr>
-          <p:cNvPr id="7" name="Picture 6" descr="Chart, line chart&#10;&#10;Description automatically generated">
-            <a:extLst>
-              <a:ext uri="{FF2B5EF4-FFF2-40B4-BE49-F238E27FC236}">
-                <a16:creationId xmlns:a16="http://schemas.microsoft.com/office/drawing/2014/main" id="{4F2C3309-F0F0-4AE2-ABC4-8A4BC35B7F8E}"/>
+          <p:cNvPr id="6" name="Picture 5" descr="Chart, line chart&#10;&#10;Description automatically generated">
+            <a:extLst>
+              <a:ext uri="{FF2B5EF4-FFF2-40B4-BE49-F238E27FC236}">
+                <a16:creationId xmlns:a16="http://schemas.microsoft.com/office/drawing/2014/main" id="{87070850-936A-497C-9F57-AC1476BD6C1D}"/>
               </a:ext>
             </a:extLst>
           </p:cNvPr>
@@ -3442,8 +3465,8 @@
         </p:blipFill>
         <p:spPr>
           <a:xfrm>
-            <a:off x="484632" y="2055230"/>
-            <a:ext cx="3517119" cy="2741394"/>
+            <a:off x="4185827" y="2046416"/>
+            <a:ext cx="3517119" cy="2747277"/>
           </a:xfrm>
           <a:prstGeom prst="rect">
             <a:avLst/>
@@ -3452,7 +3475,7 @@
       </p:pic>
       <p:cxnSp>
         <p:nvCxnSpPr>
-          <p:cNvPr id="14" name="Straight Connector 13">
+          <p:cNvPr id="21" name="Straight Connector 20">
             <a:extLst>
               <a:ext uri="{FF2B5EF4-FFF2-40B4-BE49-F238E27FC236}">
                 <a16:creationId xmlns:a16="http://schemas.microsoft.com/office/drawing/2014/main" id="{DCD67800-37AC-4E14-89B0-F79DCB3FB86D}"/>
@@ -3504,10 +3527,10 @@
       </p:cxnSp>
       <p:pic>
         <p:nvPicPr>
-          <p:cNvPr id="9" name="Picture 8" descr="Chart, line chart&#10;&#10;Description automatically generated">
-            <a:extLst>
-              <a:ext uri="{FF2B5EF4-FFF2-40B4-BE49-F238E27FC236}">
-                <a16:creationId xmlns:a16="http://schemas.microsoft.com/office/drawing/2014/main" id="{14021B27-34A2-4B57-8C65-19AC0A54615A}"/>
+          <p:cNvPr id="11" name="Picture 10" descr="Chart, line chart&#10;&#10;Description automatically generated">
+            <a:extLst>
+              <a:ext uri="{FF2B5EF4-FFF2-40B4-BE49-F238E27FC236}">
+                <a16:creationId xmlns:a16="http://schemas.microsoft.com/office/drawing/2014/main" id="{1A6DC7DC-AC7A-47C9-8023-93F3F29373FD}"/>
               </a:ext>
             </a:extLst>
           </p:cNvPr>
@@ -3530,8 +3553,8 @@
         </p:blipFill>
         <p:spPr>
           <a:xfrm>
-            <a:off x="4310676" y="2094627"/>
-            <a:ext cx="3537345" cy="2662600"/>
+            <a:off x="8288895" y="2046416"/>
+            <a:ext cx="3637638" cy="2741408"/>
           </a:xfrm>
           <a:prstGeom prst="rect">
             <a:avLst/>
@@ -3540,7 +3563,7 @@
       </p:pic>
       <p:cxnSp>
         <p:nvCxnSpPr>
-          <p:cNvPr id="16" name="Straight Connector 15">
+          <p:cNvPr id="23" name="Straight Connector 22">
             <a:extLst>
               <a:ext uri="{FF2B5EF4-FFF2-40B4-BE49-F238E27FC236}">
                 <a16:creationId xmlns:a16="http://schemas.microsoft.com/office/drawing/2014/main" id="{20F1788F-A5AE-4188-8274-F7F2E3833ECD}"/>
@@ -3592,10 +3615,10 @@
       </p:cxnSp>
       <p:pic>
         <p:nvPicPr>
-          <p:cNvPr id="5" name="Picture 4" descr="Chart, line chart&#10;&#10;Description automatically generated">
-            <a:extLst>
-              <a:ext uri="{FF2B5EF4-FFF2-40B4-BE49-F238E27FC236}">
-                <a16:creationId xmlns:a16="http://schemas.microsoft.com/office/drawing/2014/main" id="{DE18B626-FF40-43BA-AE0E-DFB3830239A5}"/>
+          <p:cNvPr id="3" name="Picture 2" descr="Chart, line chart&#10;&#10;Description automatically generated">
+            <a:extLst>
+              <a:ext uri="{FF2B5EF4-FFF2-40B4-BE49-F238E27FC236}">
+                <a16:creationId xmlns:a16="http://schemas.microsoft.com/office/drawing/2014/main" id="{D610DCC6-07E1-417C-9E61-EDFDF411F0A0}"/>
               </a:ext>
             </a:extLst>
           </p:cNvPr>
@@ -3618,52 +3641,14 @@
         </p:blipFill>
         <p:spPr>
           <a:xfrm>
-            <a:off x="8162336" y="2055230"/>
-            <a:ext cx="3517120" cy="2741395"/>
+            <a:off x="329633" y="2052287"/>
+            <a:ext cx="3517120" cy="2735537"/>
           </a:xfrm>
           <a:prstGeom prst="rect">
             <a:avLst/>
           </a:prstGeom>
         </p:spPr>
       </p:pic>
-      <p:sp>
-        <p:nvSpPr>
-          <p:cNvPr id="10" name="TextBox 9">
-            <a:extLst>
-              <a:ext uri="{FF2B5EF4-FFF2-40B4-BE49-F238E27FC236}">
-                <a16:creationId xmlns:a16="http://schemas.microsoft.com/office/drawing/2014/main" id="{C437DB1A-347E-4BE2-BF9B-02FF308CAC02}"/>
-              </a:ext>
-            </a:extLst>
-          </p:cNvPr>
-          <p:cNvSpPr txBox="1"/>
-          <p:nvPr/>
-        </p:nvSpPr>
-        <p:spPr>
-          <a:xfrm>
-            <a:off x="5120714" y="1979211"/>
-            <a:ext cx="2286474" cy="230832"/>
-          </a:xfrm>
-          <a:prstGeom prst="rect">
-            <a:avLst/>
-          </a:prstGeom>
-          <a:noFill/>
-        </p:spPr>
-        <p:txBody>
-          <a:bodyPr wrap="square" rtlCol="0">
-            <a:spAutoFit/>
-          </a:bodyPr>
-          <a:lstStyle/>
-          <a:p>
-            <a:r>
-              <a:rPr lang="en-US" sz="900" b="1" dirty="0">
-                <a:latin typeface="Cambria Math" panose="02040503050406030204" pitchFamily="18" charset="0"/>
-                <a:ea typeface="Cambria Math" panose="02040503050406030204" pitchFamily="18" charset="0"/>
-              </a:rPr>
-              <a:t>Overdose Death Rates in Washington</a:t>
-            </a:r>
-          </a:p>
-        </p:txBody>
-      </p:sp>
     </p:spTree>
     <p:extLst>
       <p:ext uri="{BB962C8B-B14F-4D97-AF65-F5344CB8AC3E}">
@@ -3702,45 +3687,9 @@
           <a:chExt cx="0" cy="0"/>
         </a:xfrm>
       </p:grpSpPr>
-      <p:pic>
-        <p:nvPicPr>
-          <p:cNvPr id="9" name="Picture 8" descr="Chart, line chart&#10;&#10;Description automatically generated">
-            <a:extLst>
-              <a:ext uri="{FF2B5EF4-FFF2-40B4-BE49-F238E27FC236}">
-                <a16:creationId xmlns:a16="http://schemas.microsoft.com/office/drawing/2014/main" id="{02EA593F-DAAC-4A81-9AFE-4DCF2DF93D69}"/>
-              </a:ext>
-            </a:extLst>
-          </p:cNvPr>
-          <p:cNvPicPr>
-            <a:picLocks noChangeAspect="1"/>
-          </p:cNvPicPr>
-          <p:nvPr/>
-        </p:nvPicPr>
-        <p:blipFill>
-          <a:blip r:embed="rId2">
-            <a:extLst>
-              <a:ext uri="{28A0092B-C50C-407E-A947-70E740481C1C}">
-                <a14:useLocalDpi xmlns:a14="http://schemas.microsoft.com/office/drawing/2010/main" val="0"/>
-              </a:ext>
-            </a:extLst>
-          </a:blip>
-          <a:stretch>
-            <a:fillRect/>
-          </a:stretch>
-        </p:blipFill>
-        <p:spPr>
-          <a:xfrm>
-            <a:off x="4337440" y="2187502"/>
-            <a:ext cx="3517119" cy="2777074"/>
-          </a:xfrm>
-          <a:prstGeom prst="rect">
-            <a:avLst/>
-          </a:prstGeom>
-        </p:spPr>
-      </p:pic>
       <p:cxnSp>
         <p:nvCxnSpPr>
-          <p:cNvPr id="14" name="Straight Connector 13">
+          <p:cNvPr id="21" name="Straight Connector 20">
             <a:extLst>
               <a:ext uri="{FF2B5EF4-FFF2-40B4-BE49-F238E27FC236}">
                 <a16:creationId xmlns:a16="http://schemas.microsoft.com/office/drawing/2014/main" id="{DCD67800-37AC-4E14-89B0-F79DCB3FB86D}"/>
@@ -3792,10 +3741,10 @@
       </p:cxnSp>
       <p:pic>
         <p:nvPicPr>
-          <p:cNvPr id="5" name="Picture 4" descr="Chart, line chart&#10;&#10;Description automatically generated">
-            <a:extLst>
-              <a:ext uri="{FF2B5EF4-FFF2-40B4-BE49-F238E27FC236}">
-                <a16:creationId xmlns:a16="http://schemas.microsoft.com/office/drawing/2014/main" id="{2BC49E7C-B400-4598-94E8-3AD522AC6930}"/>
+          <p:cNvPr id="3" name="Picture 2" descr="Chart, line chart&#10;&#10;Description automatically generated">
+            <a:extLst>
+              <a:ext uri="{FF2B5EF4-FFF2-40B4-BE49-F238E27FC236}">
+                <a16:creationId xmlns:a16="http://schemas.microsoft.com/office/drawing/2014/main" id="{9A645593-CE8D-42F5-B2D0-CFA833AA9626}"/>
               </a:ext>
             </a:extLst>
           </p:cNvPr>
@@ -3805,7 +3754,7 @@
           <p:nvPr/>
         </p:nvPicPr>
         <p:blipFill>
-          <a:blip r:embed="rId3">
+          <a:blip r:embed="rId2">
             <a:extLst>
               <a:ext uri="{28A0092B-C50C-407E-A947-70E740481C1C}">
                 <a14:useLocalDpi xmlns:a14="http://schemas.microsoft.com/office/drawing/2010/main" val="0"/>
@@ -3818,8 +3767,8 @@
         </p:blipFill>
         <p:spPr>
           <a:xfrm>
-            <a:off x="8288895" y="2237715"/>
-            <a:ext cx="3537345" cy="2726861"/>
+            <a:off x="148650" y="2052288"/>
+            <a:ext cx="3537345" cy="2763076"/>
           </a:xfrm>
           <a:prstGeom prst="rect">
             <a:avLst/>
@@ -3828,7 +3777,7 @@
       </p:pic>
       <p:cxnSp>
         <p:nvCxnSpPr>
-          <p:cNvPr id="16" name="Straight Connector 15">
+          <p:cNvPr id="23" name="Straight Connector 22">
             <a:extLst>
               <a:ext uri="{FF2B5EF4-FFF2-40B4-BE49-F238E27FC236}">
                 <a16:creationId xmlns:a16="http://schemas.microsoft.com/office/drawing/2014/main" id="{20F1788F-A5AE-4188-8274-F7F2E3833ECD}"/>
@@ -3880,10 +3829,46 @@
       </p:cxnSp>
       <p:pic>
         <p:nvPicPr>
-          <p:cNvPr id="7" name="Picture 6" descr="Chart, line chart&#10;&#10;Description automatically generated">
-            <a:extLst>
-              <a:ext uri="{FF2B5EF4-FFF2-40B4-BE49-F238E27FC236}">
-                <a16:creationId xmlns:a16="http://schemas.microsoft.com/office/drawing/2014/main" id="{7D6AFDC2-0796-4F81-B2B0-1A6819E6DD1C}"/>
+          <p:cNvPr id="11" name="Picture 10" descr="Chart, line chart&#10;&#10;Description automatically generated">
+            <a:extLst>
+              <a:ext uri="{FF2B5EF4-FFF2-40B4-BE49-F238E27FC236}">
+                <a16:creationId xmlns:a16="http://schemas.microsoft.com/office/drawing/2014/main" id="{30D26394-CF62-4588-8FED-C39C8C701112}"/>
+              </a:ext>
+            </a:extLst>
+          </p:cNvPr>
+          <p:cNvPicPr>
+            <a:picLocks noChangeAspect="1"/>
+          </p:cNvPicPr>
+          <p:nvPr/>
+        </p:nvPicPr>
+        <p:blipFill>
+          <a:blip r:embed="rId3">
+            <a:extLst>
+              <a:ext uri="{28A0092B-C50C-407E-A947-70E740481C1C}">
+                <a14:useLocalDpi xmlns:a14="http://schemas.microsoft.com/office/drawing/2010/main" val="0"/>
+              </a:ext>
+            </a:extLst>
+          </a:blip>
+          <a:stretch>
+            <a:fillRect/>
+          </a:stretch>
+        </p:blipFill>
+        <p:spPr>
+          <a:xfrm>
+            <a:off x="8162336" y="2052289"/>
+            <a:ext cx="3517120" cy="2747278"/>
+          </a:xfrm>
+          <a:prstGeom prst="rect">
+            <a:avLst/>
+          </a:prstGeom>
+        </p:spPr>
+      </p:pic>
+      <p:pic>
+        <p:nvPicPr>
+          <p:cNvPr id="13" name="Picture 12" descr="Chart, line chart&#10;&#10;Description automatically generated">
+            <a:extLst>
+              <a:ext uri="{FF2B5EF4-FFF2-40B4-BE49-F238E27FC236}">
+                <a16:creationId xmlns:a16="http://schemas.microsoft.com/office/drawing/2014/main" id="{1ECF45EE-14FA-4AA3-B79F-BCBB96F2B061}"/>
               </a:ext>
             </a:extLst>
           </p:cNvPr>
@@ -3906,8 +3891,8 @@
         </p:blipFill>
         <p:spPr>
           <a:xfrm>
-            <a:off x="491881" y="2187502"/>
-            <a:ext cx="3517120" cy="2741395"/>
+            <a:off x="4260735" y="2052288"/>
+            <a:ext cx="3517120" cy="2747279"/>
           </a:xfrm>
           <a:prstGeom prst="rect">
             <a:avLst/>
@@ -3917,7 +3902,345 @@
     </p:spTree>
     <p:extLst>
       <p:ext uri="{BB962C8B-B14F-4D97-AF65-F5344CB8AC3E}">
-        <p14:creationId xmlns:p14="http://schemas.microsoft.com/office/powerpoint/2010/main" val="3609222372"/>
+        <p14:creationId xmlns:p14="http://schemas.microsoft.com/office/powerpoint/2010/main" val="3316586828"/>
+      </p:ext>
+    </p:extLst>
+  </p:cSld>
+  <p:clrMapOvr>
+    <a:masterClrMapping/>
+  </p:clrMapOvr>
+</p:sld>
+</file>
+
+<file path=ppt/slides/slide4.xml><?xml version="1.0" encoding="utf-8"?>
+<p:sld xmlns:a="http://schemas.openxmlformats.org/drawingml/2006/main" xmlns:r="http://schemas.openxmlformats.org/officeDocument/2006/relationships" xmlns:p="http://schemas.openxmlformats.org/presentationml/2006/main">
+  <p:cSld>
+    <p:bg>
+      <p:bgPr>
+        <a:solidFill>
+          <a:schemeClr val="bg1"/>
+        </a:solidFill>
+        <a:effectLst/>
+      </p:bgPr>
+    </p:bg>
+    <p:spTree>
+      <p:nvGrpSpPr>
+        <p:cNvPr id="1" name=""/>
+        <p:cNvGrpSpPr/>
+        <p:nvPr/>
+      </p:nvGrpSpPr>
+      <p:grpSpPr>
+        <a:xfrm>
+          <a:off x="0" y="0"/>
+          <a:ext cx="0" cy="0"/>
+          <a:chOff x="0" y="0"/>
+          <a:chExt cx="0" cy="0"/>
+        </a:xfrm>
+      </p:grpSpPr>
+      <p:pic>
+        <p:nvPicPr>
+          <p:cNvPr id="7" name="Picture 6" descr="Chart, line chart&#10;&#10;Description automatically generated">
+            <a:extLst>
+              <a:ext uri="{FF2B5EF4-FFF2-40B4-BE49-F238E27FC236}">
+                <a16:creationId xmlns:a16="http://schemas.microsoft.com/office/drawing/2014/main" id="{D9B90086-DC2A-4280-AB04-0DCBC453AA7F}"/>
+              </a:ext>
+            </a:extLst>
+          </p:cNvPr>
+          <p:cNvPicPr>
+            <a:picLocks noChangeAspect="1"/>
+          </p:cNvPicPr>
+          <p:nvPr/>
+        </p:nvPicPr>
+        <p:blipFill>
+          <a:blip r:embed="rId2">
+            <a:extLst>
+              <a:ext uri="{28A0092B-C50C-407E-A947-70E740481C1C}">
+                <a14:useLocalDpi xmlns:a14="http://schemas.microsoft.com/office/drawing/2010/main" val="0"/>
+              </a:ext>
+            </a:extLst>
+          </a:blip>
+          <a:stretch>
+            <a:fillRect/>
+          </a:stretch>
+        </p:blipFill>
+        <p:spPr>
+          <a:xfrm>
+            <a:off x="1797419" y="3668347"/>
+            <a:ext cx="3507885" cy="2543217"/>
+          </a:xfrm>
+          <a:prstGeom prst="rect">
+            <a:avLst/>
+          </a:prstGeom>
+        </p:spPr>
+      </p:pic>
+      <p:cxnSp>
+        <p:nvCxnSpPr>
+          <p:cNvPr id="28" name="Straight Connector 27">
+            <a:extLst>
+              <a:ext uri="{FF2B5EF4-FFF2-40B4-BE49-F238E27FC236}">
+                <a16:creationId xmlns:a16="http://schemas.microsoft.com/office/drawing/2014/main" id="{91B6081D-D3E8-4209-B85B-EB1C655A6272}"/>
+              </a:ext>
+              <a:ext uri="{C183D7F6-B498-43B3-948B-1728B52AA6E4}">
+                <adec:decorative xmlns:adec="http://schemas.microsoft.com/office/drawing/2017/decorative" val="1"/>
+              </a:ext>
+            </a:extLst>
+          </p:cNvPr>
+          <p:cNvCxnSpPr>
+            <a:cxnSpLocks noGrp="1" noRot="1" noChangeAspect="1" noMove="1" noResize="1" noEditPoints="1" noAdjustHandles="1" noChangeArrowheads="1" noChangeShapeType="1"/>
+          </p:cNvCxnSpPr>
+          <p:nvPr>
+            <p:extLst>
+              <p:ext uri="{386F3935-93C4-4BCD-93E2-E3B085C9AB24}">
+                <p16:designElem xmlns:p16="http://schemas.microsoft.com/office/powerpoint/2015/main" val="1"/>
+              </p:ext>
+            </p:extLst>
+          </p:nvPr>
+        </p:nvCxnSpPr>
+        <p:spPr>
+          <a:xfrm>
+            <a:off x="6091214" y="1111170"/>
+            <a:ext cx="11040" cy="4645103"/>
+          </a:xfrm>
+          <a:prstGeom prst="line">
+            <a:avLst/>
+          </a:prstGeom>
+          <a:ln w="19050">
+            <a:solidFill>
+              <a:srgbClr val="7F7F7F"/>
+            </a:solidFill>
+          </a:ln>
+        </p:spPr>
+        <p:style>
+          <a:lnRef idx="1">
+            <a:schemeClr val="accent1"/>
+          </a:lnRef>
+          <a:fillRef idx="0">
+            <a:schemeClr val="accent1"/>
+          </a:fillRef>
+          <a:effectRef idx="0">
+            <a:schemeClr val="accent1"/>
+          </a:effectRef>
+          <a:fontRef idx="minor">
+            <a:schemeClr val="tx1"/>
+          </a:fontRef>
+        </p:style>
+      </p:cxnSp>
+      <p:pic>
+        <p:nvPicPr>
+          <p:cNvPr id="12" name="Picture 11" descr="Chart, line chart&#10;&#10;Description automatically generated">
+            <a:extLst>
+              <a:ext uri="{FF2B5EF4-FFF2-40B4-BE49-F238E27FC236}">
+                <a16:creationId xmlns:a16="http://schemas.microsoft.com/office/drawing/2014/main" id="{567BB259-F32A-4CB5-BDA5-339C87349656}"/>
+              </a:ext>
+            </a:extLst>
+          </p:cNvPr>
+          <p:cNvPicPr>
+            <a:picLocks noChangeAspect="1"/>
+          </p:cNvPicPr>
+          <p:nvPr/>
+        </p:nvPicPr>
+        <p:blipFill>
+          <a:blip r:embed="rId3">
+            <a:extLst>
+              <a:ext uri="{28A0092B-C50C-407E-A947-70E740481C1C}">
+                <a14:useLocalDpi xmlns:a14="http://schemas.microsoft.com/office/drawing/2010/main" val="0"/>
+              </a:ext>
+            </a:extLst>
+          </a:blip>
+          <a:stretch>
+            <a:fillRect/>
+          </a:stretch>
+        </p:blipFill>
+        <p:spPr>
+          <a:xfrm>
+            <a:off x="7030980" y="3668348"/>
+            <a:ext cx="3646189" cy="2543217"/>
+          </a:xfrm>
+          <a:prstGeom prst="rect">
+            <a:avLst/>
+          </a:prstGeom>
+        </p:spPr>
+      </p:pic>
+      <p:cxnSp>
+        <p:nvCxnSpPr>
+          <p:cNvPr id="30" name="Straight Connector 29">
+            <a:extLst>
+              <a:ext uri="{FF2B5EF4-FFF2-40B4-BE49-F238E27FC236}">
+                <a16:creationId xmlns:a16="http://schemas.microsoft.com/office/drawing/2014/main" id="{28CA55E4-1295-45C8-BA05-5A9E705B749A}"/>
+              </a:ext>
+              <a:ext uri="{C183D7F6-B498-43B3-948B-1728B52AA6E4}">
+                <adec:decorative xmlns:adec="http://schemas.microsoft.com/office/drawing/2017/decorative" val="1"/>
+              </a:ext>
+            </a:extLst>
+          </p:cNvPr>
+          <p:cNvCxnSpPr>
+            <a:cxnSpLocks noGrp="1" noRot="1" noChangeAspect="1" noMove="1" noResize="1" noEditPoints="1" noAdjustHandles="1" noChangeArrowheads="1" noChangeShapeType="1"/>
+          </p:cNvCxnSpPr>
+          <p:nvPr>
+            <p:extLst>
+              <p:ext uri="{386F3935-93C4-4BCD-93E2-E3B085C9AB24}">
+                <p16:designElem xmlns:p16="http://schemas.microsoft.com/office/powerpoint/2015/main" val="1"/>
+              </p:ext>
+            </p:extLst>
+          </p:nvPr>
+        </p:nvCxnSpPr>
+        <p:spPr>
+          <a:xfrm>
+            <a:off x="1403027" y="3428998"/>
+            <a:ext cx="4188904" cy="1"/>
+          </a:xfrm>
+          <a:prstGeom prst="line">
+            <a:avLst/>
+          </a:prstGeom>
+          <a:ln w="19050">
+            <a:solidFill>
+              <a:srgbClr val="7F7F7F"/>
+            </a:solidFill>
+          </a:ln>
+        </p:spPr>
+        <p:style>
+          <a:lnRef idx="1">
+            <a:schemeClr val="accent1"/>
+          </a:lnRef>
+          <a:fillRef idx="0">
+            <a:schemeClr val="accent1"/>
+          </a:fillRef>
+          <a:effectRef idx="0">
+            <a:schemeClr val="accent1"/>
+          </a:effectRef>
+          <a:fontRef idx="minor">
+            <a:schemeClr val="tx1"/>
+          </a:fontRef>
+        </p:style>
+      </p:cxnSp>
+      <p:cxnSp>
+        <p:nvCxnSpPr>
+          <p:cNvPr id="32" name="Straight Connector 31">
+            <a:extLst>
+              <a:ext uri="{FF2B5EF4-FFF2-40B4-BE49-F238E27FC236}">
+                <a16:creationId xmlns:a16="http://schemas.microsoft.com/office/drawing/2014/main" id="{08C5794E-A9A1-4A23-AF68-C79A7822334C}"/>
+              </a:ext>
+              <a:ext uri="{C183D7F6-B498-43B3-948B-1728B52AA6E4}">
+                <adec:decorative xmlns:adec="http://schemas.microsoft.com/office/drawing/2017/decorative" val="1"/>
+              </a:ext>
+            </a:extLst>
+          </p:cNvPr>
+          <p:cNvCxnSpPr>
+            <a:cxnSpLocks noGrp="1" noRot="1" noChangeAspect="1" noMove="1" noResize="1" noEditPoints="1" noAdjustHandles="1" noChangeArrowheads="1" noChangeShapeType="1"/>
+          </p:cNvCxnSpPr>
+          <p:nvPr>
+            <p:extLst>
+              <p:ext uri="{386F3935-93C4-4BCD-93E2-E3B085C9AB24}">
+                <p16:designElem xmlns:p16="http://schemas.microsoft.com/office/powerpoint/2015/main" val="1"/>
+              </p:ext>
+            </p:extLst>
+          </p:nvPr>
+        </p:nvCxnSpPr>
+        <p:spPr>
+          <a:xfrm>
+            <a:off x="6610334" y="3428998"/>
+            <a:ext cx="4188904" cy="1"/>
+          </a:xfrm>
+          <a:prstGeom prst="line">
+            <a:avLst/>
+          </a:prstGeom>
+          <a:ln w="19050">
+            <a:solidFill>
+              <a:srgbClr val="7F7F7F"/>
+            </a:solidFill>
+          </a:ln>
+        </p:spPr>
+        <p:style>
+          <a:lnRef idx="1">
+            <a:schemeClr val="accent1"/>
+          </a:lnRef>
+          <a:fillRef idx="0">
+            <a:schemeClr val="accent1"/>
+          </a:fillRef>
+          <a:effectRef idx="0">
+            <a:schemeClr val="accent1"/>
+          </a:effectRef>
+          <a:fontRef idx="minor">
+            <a:schemeClr val="tx1"/>
+          </a:fontRef>
+        </p:style>
+      </p:cxnSp>
+      <p:pic>
+        <p:nvPicPr>
+          <p:cNvPr id="9" name="Picture 8" descr="Chart, line chart&#10;&#10;Description automatically generated">
+            <a:extLst>
+              <a:ext uri="{FF2B5EF4-FFF2-40B4-BE49-F238E27FC236}">
+                <a16:creationId xmlns:a16="http://schemas.microsoft.com/office/drawing/2014/main" id="{358894B5-DE76-4E86-B45D-276445033721}"/>
+              </a:ext>
+            </a:extLst>
+          </p:cNvPr>
+          <p:cNvPicPr>
+            <a:picLocks noChangeAspect="1"/>
+          </p:cNvPicPr>
+          <p:nvPr/>
+        </p:nvPicPr>
+        <p:blipFill>
+          <a:blip r:embed="rId4">
+            <a:extLst>
+              <a:ext uri="{28A0092B-C50C-407E-A947-70E740481C1C}">
+                <a14:useLocalDpi xmlns:a14="http://schemas.microsoft.com/office/drawing/2010/main" val="0"/>
+              </a:ext>
+            </a:extLst>
+          </a:blip>
+          <a:stretch>
+            <a:fillRect/>
+          </a:stretch>
+        </p:blipFill>
+        <p:spPr>
+          <a:xfrm>
+            <a:off x="7030980" y="709943"/>
+            <a:ext cx="3490069" cy="2545862"/>
+          </a:xfrm>
+          <a:prstGeom prst="rect">
+            <a:avLst/>
+          </a:prstGeom>
+        </p:spPr>
+      </p:pic>
+      <p:pic>
+        <p:nvPicPr>
+          <p:cNvPr id="4" name="Picture 3" descr="Chart, line chart&#10;&#10;Description automatically generated">
+            <a:extLst>
+              <a:ext uri="{FF2B5EF4-FFF2-40B4-BE49-F238E27FC236}">
+                <a16:creationId xmlns:a16="http://schemas.microsoft.com/office/drawing/2014/main" id="{B270C160-BC16-4C84-957D-EB6F8CC7C910}"/>
+              </a:ext>
+            </a:extLst>
+          </p:cNvPr>
+          <p:cNvPicPr>
+            <a:picLocks noChangeAspect="1"/>
+          </p:cNvPicPr>
+          <p:nvPr/>
+        </p:nvPicPr>
+        <p:blipFill>
+          <a:blip r:embed="rId5">
+            <a:extLst>
+              <a:ext uri="{28A0092B-C50C-407E-A947-70E740481C1C}">
+                <a14:useLocalDpi xmlns:a14="http://schemas.microsoft.com/office/drawing/2010/main" val="0"/>
+              </a:ext>
+            </a:extLst>
+          </a:blip>
+          <a:stretch>
+            <a:fillRect/>
+          </a:stretch>
+        </p:blipFill>
+        <p:spPr>
+          <a:xfrm>
+            <a:off x="1797419" y="709943"/>
+            <a:ext cx="3439015" cy="2553469"/>
+          </a:xfrm>
+          <a:prstGeom prst="rect">
+            <a:avLst/>
+          </a:prstGeom>
+        </p:spPr>
+      </p:pic>
+    </p:spTree>
+    <p:extLst>
+      <p:ext uri="{BB962C8B-B14F-4D97-AF65-F5344CB8AC3E}">
+        <p14:creationId xmlns:p14="http://schemas.microsoft.com/office/powerpoint/2010/main" val="3723053852"/>
       </p:ext>
     </p:extLst>
   </p:cSld>

</xml_diff>